<commit_message>
deleted old json files
</commit_message>
<xml_diff>
--- a/json_scripts/Molecules_Figures.pptx
+++ b/json_scripts/Molecules_Figures.pptx
@@ -266,7 +266,7 @@
           <a:p>
             <a:fld id="{DEB12F8E-F915-1A4B-822E-B932D383B8B3}" type="datetimeFigureOut">
               <a:rPr lang="en-US" smtClean="0"/>
-              <a:t>10/16/24</a:t>
+              <a:t>3/11/25</a:t>
             </a:fld>
             <a:endParaRPr lang="en-US"/>
           </a:p>
@@ -464,7 +464,7 @@
           <a:p>
             <a:fld id="{DEB12F8E-F915-1A4B-822E-B932D383B8B3}" type="datetimeFigureOut">
               <a:rPr lang="en-US" smtClean="0"/>
-              <a:t>10/16/24</a:t>
+              <a:t>3/11/25</a:t>
             </a:fld>
             <a:endParaRPr lang="en-US"/>
           </a:p>
@@ -672,7 +672,7 @@
           <a:p>
             <a:fld id="{DEB12F8E-F915-1A4B-822E-B932D383B8B3}" type="datetimeFigureOut">
               <a:rPr lang="en-US" smtClean="0"/>
-              <a:t>10/16/24</a:t>
+              <a:t>3/11/25</a:t>
             </a:fld>
             <a:endParaRPr lang="en-US"/>
           </a:p>
@@ -870,7 +870,7 @@
           <a:p>
             <a:fld id="{DEB12F8E-F915-1A4B-822E-B932D383B8B3}" type="datetimeFigureOut">
               <a:rPr lang="en-US" smtClean="0"/>
-              <a:t>10/16/24</a:t>
+              <a:t>3/11/25</a:t>
             </a:fld>
             <a:endParaRPr lang="en-US"/>
           </a:p>
@@ -1145,7 +1145,7 @@
           <a:p>
             <a:fld id="{DEB12F8E-F915-1A4B-822E-B932D383B8B3}" type="datetimeFigureOut">
               <a:rPr lang="en-US" smtClean="0"/>
-              <a:t>10/16/24</a:t>
+              <a:t>3/11/25</a:t>
             </a:fld>
             <a:endParaRPr lang="en-US"/>
           </a:p>
@@ -1410,7 +1410,7 @@
           <a:p>
             <a:fld id="{DEB12F8E-F915-1A4B-822E-B932D383B8B3}" type="datetimeFigureOut">
               <a:rPr lang="en-US" smtClean="0"/>
-              <a:t>10/16/24</a:t>
+              <a:t>3/11/25</a:t>
             </a:fld>
             <a:endParaRPr lang="en-US"/>
           </a:p>
@@ -1822,7 +1822,7 @@
           <a:p>
             <a:fld id="{DEB12F8E-F915-1A4B-822E-B932D383B8B3}" type="datetimeFigureOut">
               <a:rPr lang="en-US" smtClean="0"/>
-              <a:t>10/16/24</a:t>
+              <a:t>3/11/25</a:t>
             </a:fld>
             <a:endParaRPr lang="en-US"/>
           </a:p>
@@ -1963,7 +1963,7 @@
           <a:p>
             <a:fld id="{DEB12F8E-F915-1A4B-822E-B932D383B8B3}" type="datetimeFigureOut">
               <a:rPr lang="en-US" smtClean="0"/>
-              <a:t>10/16/24</a:t>
+              <a:t>3/11/25</a:t>
             </a:fld>
             <a:endParaRPr lang="en-US"/>
           </a:p>
@@ -2076,7 +2076,7 @@
           <a:p>
             <a:fld id="{DEB12F8E-F915-1A4B-822E-B932D383B8B3}" type="datetimeFigureOut">
               <a:rPr lang="en-US" smtClean="0"/>
-              <a:t>10/16/24</a:t>
+              <a:t>3/11/25</a:t>
             </a:fld>
             <a:endParaRPr lang="en-US"/>
           </a:p>
@@ -2387,7 +2387,7 @@
           <a:p>
             <a:fld id="{DEB12F8E-F915-1A4B-822E-B932D383B8B3}" type="datetimeFigureOut">
               <a:rPr lang="en-US" smtClean="0"/>
-              <a:t>10/16/24</a:t>
+              <a:t>3/11/25</a:t>
             </a:fld>
             <a:endParaRPr lang="en-US"/>
           </a:p>
@@ -2675,7 +2675,7 @@
           <a:p>
             <a:fld id="{DEB12F8E-F915-1A4B-822E-B932D383B8B3}" type="datetimeFigureOut">
               <a:rPr lang="en-US" smtClean="0"/>
-              <a:t>10/16/24</a:t>
+              <a:t>3/11/25</a:t>
             </a:fld>
             <a:endParaRPr lang="en-US"/>
           </a:p>
@@ -2916,7 +2916,7 @@
           <a:p>
             <a:fld id="{DEB12F8E-F915-1A4B-822E-B932D383B8B3}" type="datetimeFigureOut">
               <a:rPr lang="en-US" smtClean="0"/>
-              <a:t>10/16/24</a:t>
+              <a:t>3/11/25</a:t>
             </a:fld>
             <a:endParaRPr lang="en-US"/>
           </a:p>
@@ -4942,8 +4942,8 @@
           </a:prstGeom>
         </p:spPr>
       </p:pic>
-      <mc:AlternateContent xmlns:mc="http://schemas.openxmlformats.org/markup-compatibility/2006">
-        <mc:Choice xmlns:a14="http://schemas.microsoft.com/office/drawing/2010/main" Requires="a14">
+      <mc:AlternateContent xmlns:mc="http://schemas.openxmlformats.org/markup-compatibility/2006" xmlns:a14="http://schemas.microsoft.com/office/drawing/2010/main">
+        <mc:Choice Requires="a14">
           <p:sp>
             <p:nvSpPr>
               <p:cNvPr id="3" name="TextBox 2">
@@ -5070,7 +5070,7 @@
             </p:txBody>
           </p:sp>
         </mc:Choice>
-        <mc:Fallback>
+        <mc:Fallback xmlns="">
           <p:sp>
             <p:nvSpPr>
               <p:cNvPr id="3" name="TextBox 2">

</xml_diff>